<commit_message>
updated system overview image for readme
</commit_message>
<xml_diff>
--- a/project/poster/figures.pptx
+++ b/project/poster/figures.pptx
@@ -107,6 +107,11 @@
       </a:defRPr>
     </a:lvl9pPr>
   </p:defaultTextStyle>
+  <p:extLst>
+    <p:ext uri="{EFAFB233-063F-42B5-8137-9DF3F51BA10A}">
+      <p15:sldGuideLst xmlns:p15="http://schemas.microsoft.com/office/powerpoint/2012/main"/>
+    </p:ext>
+  </p:extLst>
 </p:presentation>
 </file>
 
@@ -192,7 +197,7 @@
           <a:p>
             <a:fld id="{8912E7E4-D8AD-40D7-B9FC-A893B5BF0AA6}" type="datetimeFigureOut">
               <a:rPr lang="en-AU" smtClean="0"/>
-              <a:t>10/02/2018</a:t>
+              <a:t>13/02/2018</a:t>
             </a:fld>
             <a:endParaRPr lang="en-AU"/>
           </a:p>
@@ -696,7 +701,7 @@
           <a:p>
             <a:fld id="{AA7AED58-9745-42B5-9497-1D30A521C16E}" type="datetimeFigureOut">
               <a:rPr lang="en-AU" smtClean="0"/>
-              <a:t>10/02/2018</a:t>
+              <a:t>13/02/2018</a:t>
             </a:fld>
             <a:endParaRPr lang="en-AU"/>
           </a:p>
@@ -896,7 +901,7 @@
           <a:p>
             <a:fld id="{AA7AED58-9745-42B5-9497-1D30A521C16E}" type="datetimeFigureOut">
               <a:rPr lang="en-AU" smtClean="0"/>
-              <a:t>10/02/2018</a:t>
+              <a:t>13/02/2018</a:t>
             </a:fld>
             <a:endParaRPr lang="en-AU"/>
           </a:p>
@@ -1106,7 +1111,7 @@
           <a:p>
             <a:fld id="{AA7AED58-9745-42B5-9497-1D30A521C16E}" type="datetimeFigureOut">
               <a:rPr lang="en-AU" smtClean="0"/>
-              <a:t>10/02/2018</a:t>
+              <a:t>13/02/2018</a:t>
             </a:fld>
             <a:endParaRPr lang="en-AU"/>
           </a:p>
@@ -1306,7 +1311,7 @@
           <a:p>
             <a:fld id="{AA7AED58-9745-42B5-9497-1D30A521C16E}" type="datetimeFigureOut">
               <a:rPr lang="en-AU" smtClean="0"/>
-              <a:t>10/02/2018</a:t>
+              <a:t>13/02/2018</a:t>
             </a:fld>
             <a:endParaRPr lang="en-AU"/>
           </a:p>
@@ -1582,7 +1587,7 @@
           <a:p>
             <a:fld id="{AA7AED58-9745-42B5-9497-1D30A521C16E}" type="datetimeFigureOut">
               <a:rPr lang="en-AU" smtClean="0"/>
-              <a:t>10/02/2018</a:t>
+              <a:t>13/02/2018</a:t>
             </a:fld>
             <a:endParaRPr lang="en-AU"/>
           </a:p>
@@ -1850,7 +1855,7 @@
           <a:p>
             <a:fld id="{AA7AED58-9745-42B5-9497-1D30A521C16E}" type="datetimeFigureOut">
               <a:rPr lang="en-AU" smtClean="0"/>
-              <a:t>10/02/2018</a:t>
+              <a:t>13/02/2018</a:t>
             </a:fld>
             <a:endParaRPr lang="en-AU"/>
           </a:p>
@@ -2265,7 +2270,7 @@
           <a:p>
             <a:fld id="{AA7AED58-9745-42B5-9497-1D30A521C16E}" type="datetimeFigureOut">
               <a:rPr lang="en-AU" smtClean="0"/>
-              <a:t>10/02/2018</a:t>
+              <a:t>13/02/2018</a:t>
             </a:fld>
             <a:endParaRPr lang="en-AU"/>
           </a:p>
@@ -2407,7 +2412,7 @@
           <a:p>
             <a:fld id="{AA7AED58-9745-42B5-9497-1D30A521C16E}" type="datetimeFigureOut">
               <a:rPr lang="en-AU" smtClean="0"/>
-              <a:t>10/02/2018</a:t>
+              <a:t>13/02/2018</a:t>
             </a:fld>
             <a:endParaRPr lang="en-AU"/>
           </a:p>
@@ -2520,7 +2525,7 @@
           <a:p>
             <a:fld id="{AA7AED58-9745-42B5-9497-1D30A521C16E}" type="datetimeFigureOut">
               <a:rPr lang="en-AU" smtClean="0"/>
-              <a:t>10/02/2018</a:t>
+              <a:t>13/02/2018</a:t>
             </a:fld>
             <a:endParaRPr lang="en-AU"/>
           </a:p>
@@ -2833,7 +2838,7 @@
           <a:p>
             <a:fld id="{AA7AED58-9745-42B5-9497-1D30A521C16E}" type="datetimeFigureOut">
               <a:rPr lang="en-AU" smtClean="0"/>
-              <a:t>10/02/2018</a:t>
+              <a:t>13/02/2018</a:t>
             </a:fld>
             <a:endParaRPr lang="en-AU"/>
           </a:p>
@@ -3122,7 +3127,7 @@
           <a:p>
             <a:fld id="{AA7AED58-9745-42B5-9497-1D30A521C16E}" type="datetimeFigureOut">
               <a:rPr lang="en-AU" smtClean="0"/>
-              <a:t>10/02/2018</a:t>
+              <a:t>13/02/2018</a:t>
             </a:fld>
             <a:endParaRPr lang="en-AU"/>
           </a:p>
@@ -3365,7 +3370,7 @@
           <a:p>
             <a:fld id="{AA7AED58-9745-42B5-9497-1D30A521C16E}" type="datetimeFigureOut">
               <a:rPr lang="en-AU" smtClean="0"/>
-              <a:t>10/02/2018</a:t>
+              <a:t>13/02/2018</a:t>
             </a:fld>
             <a:endParaRPr lang="en-AU"/>
           </a:p>
@@ -5401,7 +5406,7 @@
         </p:nvSpPr>
         <p:spPr>
           <a:xfrm>
-            <a:off x="5463887" y="2577694"/>
+            <a:off x="5495040" y="2611878"/>
             <a:ext cx="1080000" cy="900000"/>
           </a:xfrm>
           <a:prstGeom prst="roundRect">
@@ -5638,8 +5643,8 @@
         </p:nvSpPr>
         <p:spPr>
           <a:xfrm rot="16200000">
-            <a:off x="5844613" y="2175908"/>
-            <a:ext cx="360000" cy="270000"/>
+            <a:off x="5789418" y="2175908"/>
+            <a:ext cx="470390" cy="270000"/>
           </a:xfrm>
           <a:prstGeom prst="leftRightArrow">
             <a:avLst/>
@@ -6132,7 +6137,7 @@
                 <a:latin typeface="Minion Pro" panose="02040703060201020203" pitchFamily="18" charset="0"/>
                 <a:cs typeface="Helvetica" panose="020B0604020202020204" pitchFamily="34" charset="0"/>
               </a:rPr>
-              <a:t>Pawsey Supercomputing Centre</a:t>
+              <a:t>GPU Cluster</a:t>
             </a:r>
           </a:p>
         </p:txBody>

</xml_diff>